<commit_message>
Fix Edit home and about us page
</commit_message>
<xml_diff>
--- a/documents/GREENSKI (1).pptx
+++ b/documents/GREENSKI (1).pptx
@@ -8486,7 +8486,12 @@
             <p:ph type="title"/>
           </p:nvPr>
         </p:nvSpPr>
-        <p:spPr/>
+        <p:spPr>
+          <a:xfrm>
+            <a:off x="1143001" y="21990"/>
+            <a:ext cx="9905998" cy="1905000"/>
+          </a:xfrm>
+        </p:spPr>
         <p:txBody>
           <a:bodyPr/>
           <a:lstStyle/>
@@ -8516,93 +8521,272 @@
       </p:sp>
       <p:sp>
         <p:nvSpPr>
-          <p:cNvPr id="3" name="Content Placeholder 2">
+          <p:cNvPr id="4" name="TextBox 3">
             <a:extLst>
               <a:ext uri="{FF2B5EF4-FFF2-40B4-BE49-F238E27FC236}">
-                <a16:creationId xmlns:a16="http://schemas.microsoft.com/office/drawing/2014/main" id="{1C0A77A2-7667-765F-3A19-47ECC647CEBC}"/>
+                <a16:creationId xmlns:a16="http://schemas.microsoft.com/office/drawing/2014/main" id="{DE60B21F-710B-611C-EC82-D2709816623F}"/>
               </a:ext>
             </a:extLst>
           </p:cNvPr>
-          <p:cNvSpPr>
-            <a:spLocks noGrp="1"/>
-          </p:cNvSpPr>
-          <p:nvPr>
-            <p:ph idx="1"/>
-          </p:nvPr>
+          <p:cNvSpPr txBox="1"/>
+          <p:nvPr/>
         </p:nvSpPr>
         <p:spPr>
           <a:xfrm>
-            <a:off x="1141413" y="1914407"/>
-            <a:ext cx="9905998" cy="3124201"/>
+            <a:off x="8124825" y="747625"/>
+            <a:ext cx="2454123" cy="707886"/>
           </a:xfrm>
+          <a:prstGeom prst="rect">
+            <a:avLst/>
+          </a:prstGeom>
+          <a:noFill/>
         </p:spPr>
         <p:txBody>
-          <a:bodyPr/>
+          <a:bodyPr wrap="square" rtlCol="0">
+            <a:spAutoFit/>
+          </a:bodyPr>
           <a:lstStyle/>
           <a:p>
-            <a:pPr marL="0" indent="0">
-              <a:buNone/>
-            </a:pPr>
-            <a:r>
-              <a:rPr lang="en-US" sz="3200" dirty="0">
-                <a:effectLst>
-                  <a:glow rad="38100">
-                    <a:prstClr val="black">
-                      <a:lumMod val="50000"/>
-                      <a:lumOff val="50000"/>
-                      <a:alpha val="20000"/>
-                    </a:prstClr>
-                  </a:glow>
-                  <a:outerShdw blurRad="44450" dist="12700" dir="13860000" algn="tl" rotWithShape="0">
-                    <a:srgbClr val="000000">
-                      <a:alpha val="20000"/>
-                    </a:srgbClr>
-                  </a:outerShdw>
-                </a:effectLst>
+            <a:r>
+              <a:rPr lang="en-US" sz="4000" dirty="0">
+                <a:solidFill>
+                  <a:schemeClr val="bg1"/>
+                </a:solidFill>
+                <a:latin typeface="Helvetica" panose="020B0604020202020204" pitchFamily="34" charset="0"/>
+                <a:cs typeface="Helvetica" panose="020B0604020202020204" pitchFamily="34" charset="0"/>
               </a:rPr>
-              <a:t>The idea and the goal of our project is to show a new invention that is eco-friendly and practical for the </a:t>
-            </a:r>
-            <a:r>
-              <a:rPr lang="en-US" sz="3200" err="1">
-                <a:effectLst>
-                  <a:glow rad="38100">
-                    <a:prstClr val="black">
-                      <a:lumMod val="50000"/>
-                      <a:lumOff val="50000"/>
-                      <a:alpha val="20000"/>
-                    </a:prstClr>
-                  </a:glow>
-                  <a:outerShdw blurRad="44450" dist="12700" dir="13860000" algn="tl" rotWithShape="0">
-                    <a:srgbClr val="000000">
-                      <a:alpha val="20000"/>
-                    </a:srgbClr>
-                  </a:outerShdw>
-                </a:effectLst>
-              </a:rPr>
-              <a:t>enviroment</a:t>
-            </a:r>
-            <a:r>
-              <a:rPr lang="en-US" sz="3200" dirty="0">
-                <a:effectLst>
-                  <a:glow rad="38100">
-                    <a:prstClr val="black">
-                      <a:lumMod val="50000"/>
-                      <a:lumOff val="50000"/>
-                      <a:alpha val="20000"/>
-                    </a:prstClr>
-                  </a:glow>
-                  <a:outerShdw blurRad="44450" dist="12700" dir="13860000" algn="tl" rotWithShape="0">
-                    <a:srgbClr val="000000">
-                      <a:alpha val="20000"/>
-                    </a:srgbClr>
-                  </a:outerShdw>
-                </a:effectLst>
-              </a:rPr>
-              <a:t>. Also the project aims to target more people to think outside the box and develop futuristic creations.</a:t>
-            </a:r>
-          </a:p>
-        </p:txBody>
-      </p:sp>
+              <a:t>The plan!</a:t>
+            </a:r>
+          </a:p>
+        </p:txBody>
+      </p:sp>
+      <p:cxnSp>
+        <p:nvCxnSpPr>
+          <p:cNvPr id="5" name="Connector: Curved 4">
+            <a:extLst>
+              <a:ext uri="{FF2B5EF4-FFF2-40B4-BE49-F238E27FC236}">
+                <a16:creationId xmlns:a16="http://schemas.microsoft.com/office/drawing/2014/main" id="{B26AE1E6-661B-3D14-5D0D-18B0AE6C84C4}"/>
+              </a:ext>
+            </a:extLst>
+          </p:cNvPr>
+          <p:cNvCxnSpPr>
+            <a:cxnSpLocks/>
+          </p:cNvCxnSpPr>
+          <p:nvPr/>
+        </p:nvCxnSpPr>
+        <p:spPr>
+          <a:xfrm>
+            <a:off x="4895850" y="2707071"/>
+            <a:ext cx="2286000" cy="674304"/>
+          </a:xfrm>
+          <a:prstGeom prst="curvedConnector3">
+            <a:avLst/>
+          </a:prstGeom>
+          <a:ln>
+            <a:solidFill>
+              <a:schemeClr val="bg1"/>
+            </a:solidFill>
+            <a:tailEnd type="triangle"/>
+          </a:ln>
+        </p:spPr>
+        <p:style>
+          <a:lnRef idx="1">
+            <a:schemeClr val="dk1"/>
+          </a:lnRef>
+          <a:fillRef idx="0">
+            <a:schemeClr val="dk1"/>
+          </a:fillRef>
+          <a:effectRef idx="0">
+            <a:schemeClr val="dk1"/>
+          </a:effectRef>
+          <a:fontRef idx="minor">
+            <a:schemeClr val="tx1"/>
+          </a:fontRef>
+        </p:style>
+      </p:cxnSp>
+      <p:cxnSp>
+        <p:nvCxnSpPr>
+          <p:cNvPr id="6" name="Connector: Curved 5">
+            <a:extLst>
+              <a:ext uri="{FF2B5EF4-FFF2-40B4-BE49-F238E27FC236}">
+                <a16:creationId xmlns:a16="http://schemas.microsoft.com/office/drawing/2014/main" id="{D16E7B36-A5F6-89D0-A8E0-CE806DC20F17}"/>
+              </a:ext>
+            </a:extLst>
+          </p:cNvPr>
+          <p:cNvCxnSpPr/>
+          <p:nvPr/>
+        </p:nvCxnSpPr>
+        <p:spPr>
+          <a:xfrm rot="10800000" flipV="1">
+            <a:off x="5664938" y="3815144"/>
+            <a:ext cx="1516912" cy="1094993"/>
+          </a:xfrm>
+          <a:prstGeom prst="curvedConnector3">
+            <a:avLst/>
+          </a:prstGeom>
+          <a:ln>
+            <a:solidFill>
+              <a:schemeClr val="bg1"/>
+            </a:solidFill>
+            <a:tailEnd type="triangle"/>
+          </a:ln>
+        </p:spPr>
+        <p:style>
+          <a:lnRef idx="1">
+            <a:schemeClr val="accent1"/>
+          </a:lnRef>
+          <a:fillRef idx="0">
+            <a:schemeClr val="accent1"/>
+          </a:fillRef>
+          <a:effectRef idx="0">
+            <a:schemeClr val="accent1"/>
+          </a:effectRef>
+          <a:fontRef idx="minor">
+            <a:schemeClr val="tx1"/>
+          </a:fontRef>
+        </p:style>
+      </p:cxnSp>
+      <p:pic>
+        <p:nvPicPr>
+          <p:cNvPr id="7" name="Picture 6" descr="Business Team Brainstormin, Discussing Graphic by DEEMKA STUDIO · Creative  Fabrica">
+            <a:extLst>
+              <a:ext uri="{FF2B5EF4-FFF2-40B4-BE49-F238E27FC236}">
+                <a16:creationId xmlns:a16="http://schemas.microsoft.com/office/drawing/2014/main" id="{ECF77904-2083-A875-4A56-6F34D5A5C2EB}"/>
+              </a:ext>
+            </a:extLst>
+          </p:cNvPr>
+          <p:cNvPicPr>
+            <a:picLocks noChangeAspect="1" noChangeArrowheads="1"/>
+          </p:cNvPicPr>
+          <p:nvPr/>
+        </p:nvPicPr>
+        <p:blipFill>
+          <a:blip r:embed="rId2">
+            <a:extLst>
+              <a:ext uri="{28A0092B-C50C-407E-A947-70E740481C1C}">
+                <a14:useLocalDpi xmlns:a14="http://schemas.microsoft.com/office/drawing/2010/main" val="0"/>
+              </a:ext>
+            </a:extLst>
+          </a:blip>
+          <a:srcRect/>
+          <a:stretch>
+            <a:fillRect/>
+          </a:stretch>
+        </p:blipFill>
+        <p:spPr bwMode="auto">
+          <a:xfrm>
+            <a:off x="6749388" y="2107055"/>
+            <a:ext cx="3829561" cy="2548639"/>
+          </a:xfrm>
+          <a:prstGeom prst="rect">
+            <a:avLst/>
+          </a:prstGeom>
+          <a:noFill/>
+          <a:extLst>
+            <a:ext uri="{909E8E84-426E-40DD-AFC4-6F175D3DCCD1}">
+              <a14:hiddenFill xmlns:a14="http://schemas.microsoft.com/office/drawing/2010/main">
+                <a:solidFill>
+                  <a:srgbClr val="FFFFFF"/>
+                </a:solidFill>
+              </a14:hiddenFill>
+            </a:ext>
+          </a:extLst>
+        </p:spPr>
+      </p:pic>
+      <p:pic>
+        <p:nvPicPr>
+          <p:cNvPr id="8" name="Picture 8" descr="Idea - Free business icons">
+            <a:extLst>
+              <a:ext uri="{FF2B5EF4-FFF2-40B4-BE49-F238E27FC236}">
+                <a16:creationId xmlns:a16="http://schemas.microsoft.com/office/drawing/2014/main" id="{D2852E90-DF0F-E47E-4796-FD12549CD844}"/>
+              </a:ext>
+            </a:extLst>
+          </p:cNvPr>
+          <p:cNvPicPr>
+            <a:picLocks noChangeAspect="1" noChangeArrowheads="1"/>
+          </p:cNvPicPr>
+          <p:nvPr/>
+        </p:nvPicPr>
+        <p:blipFill>
+          <a:blip r:embed="rId3" cstate="print">
+            <a:extLst>
+              <a:ext uri="{28A0092B-C50C-407E-A947-70E740481C1C}">
+                <a14:useLocalDpi xmlns:a14="http://schemas.microsoft.com/office/drawing/2010/main" val="0"/>
+              </a:ext>
+            </a:extLst>
+          </a:blip>
+          <a:srcRect/>
+          <a:stretch>
+            <a:fillRect/>
+          </a:stretch>
+        </p:blipFill>
+        <p:spPr bwMode="auto">
+          <a:xfrm>
+            <a:off x="2989730" y="1303892"/>
+            <a:ext cx="1925863" cy="1925863"/>
+          </a:xfrm>
+          <a:prstGeom prst="rect">
+            <a:avLst/>
+          </a:prstGeom>
+          <a:noFill/>
+          <a:extLst>
+            <a:ext uri="{909E8E84-426E-40DD-AFC4-6F175D3DCCD1}">
+              <a14:hiddenFill xmlns:a14="http://schemas.microsoft.com/office/drawing/2010/main">
+                <a:solidFill>
+                  <a:srgbClr val="FFFFFF"/>
+                </a:solidFill>
+              </a14:hiddenFill>
+            </a:ext>
+          </a:extLst>
+        </p:spPr>
+      </p:pic>
+      <p:pic>
+        <p:nvPicPr>
+          <p:cNvPr id="9" name="Picture 10" descr="Best Coding Homework Help - Programming Homework Help">
+            <a:extLst>
+              <a:ext uri="{FF2B5EF4-FFF2-40B4-BE49-F238E27FC236}">
+                <a16:creationId xmlns:a16="http://schemas.microsoft.com/office/drawing/2014/main" id="{454DEBB1-9FFD-AA87-E6AC-58FC3E668148}"/>
+              </a:ext>
+            </a:extLst>
+          </p:cNvPr>
+          <p:cNvPicPr>
+            <a:picLocks noChangeAspect="1" noChangeArrowheads="1"/>
+          </p:cNvPicPr>
+          <p:nvPr/>
+        </p:nvPicPr>
+        <p:blipFill>
+          <a:blip r:embed="rId4" cstate="print">
+            <a:extLst>
+              <a:ext uri="{28A0092B-C50C-407E-A947-70E740481C1C}">
+                <a14:useLocalDpi xmlns:a14="http://schemas.microsoft.com/office/drawing/2010/main" val="0"/>
+              </a:ext>
+            </a:extLst>
+          </a:blip>
+          <a:srcRect/>
+          <a:stretch>
+            <a:fillRect/>
+          </a:stretch>
+        </p:blipFill>
+        <p:spPr bwMode="auto">
+          <a:xfrm>
+            <a:off x="3070997" y="3829771"/>
+            <a:ext cx="2579252" cy="2579252"/>
+          </a:xfrm>
+          <a:prstGeom prst="rect">
+            <a:avLst/>
+          </a:prstGeom>
+          <a:noFill/>
+          <a:extLst>
+            <a:ext uri="{909E8E84-426E-40DD-AFC4-6F175D3DCCD1}">
+              <a14:hiddenFill xmlns:a14="http://schemas.microsoft.com/office/drawing/2010/main">
+                <a:solidFill>
+                  <a:srgbClr val="FFFFFF"/>
+                </a:solidFill>
+              </a14:hiddenFill>
+            </a:ext>
+          </a:extLst>
+        </p:spPr>
+      </p:pic>
     </p:spTree>
     <p:extLst>
       <p:ext uri="{BB962C8B-B14F-4D97-AF65-F5344CB8AC3E}">

</xml_diff>